<commit_message>
Major changes to etl process, now classifying the customer cohort based on date of first purchase of either a one-time or membership product. Added new measures to Cohort Analysis.pbix as well (n customers and ltv per customers).
</commit_message>
<xml_diff>
--- a/Visual Assets/Possible Backgrounds.pptx
+++ b/Visual Assets/Possible Backgrounds.pptx
@@ -9,6 +9,7 @@
     <p:sldId id="257" r:id="rId3"/>
     <p:sldId id="258" r:id="rId4"/>
     <p:sldId id="259" r:id="rId5"/>
+    <p:sldId id="260" r:id="rId6"/>
   </p:sldIdLst>
   <p:sldSz cx="12192000" cy="6858000"/>
   <p:notesSz cx="6858000" cy="9144000"/>
@@ -107,6 +108,11 @@
       </a:defRPr>
     </a:lvl9pPr>
   </p:defaultTextStyle>
+  <p:extLst>
+    <p:ext uri="{EFAFB233-063F-42B5-8137-9DF3F51BA10A}">
+      <p15:sldGuideLst xmlns:p15="http://schemas.microsoft.com/office/powerpoint/2012/main"/>
+    </p:ext>
+  </p:extLst>
 </p:presentation>
 </file>
 
@@ -257,7 +263,7 @@
           <a:p>
             <a:fld id="{282267A0-FE7A-4CFE-BCE9-2173F1C93B40}" type="datetimeFigureOut">
               <a:rPr lang="en-US" smtClean="0"/>
-              <a:t>12/1/2021</a:t>
+              <a:t>12/2/2021</a:t>
             </a:fld>
             <a:endParaRPr lang="en-US"/>
           </a:p>
@@ -455,7 +461,7 @@
           <a:p>
             <a:fld id="{282267A0-FE7A-4CFE-BCE9-2173F1C93B40}" type="datetimeFigureOut">
               <a:rPr lang="en-US" smtClean="0"/>
-              <a:t>12/1/2021</a:t>
+              <a:t>12/2/2021</a:t>
             </a:fld>
             <a:endParaRPr lang="en-US"/>
           </a:p>
@@ -663,7 +669,7 @@
           <a:p>
             <a:fld id="{282267A0-FE7A-4CFE-BCE9-2173F1C93B40}" type="datetimeFigureOut">
               <a:rPr lang="en-US" smtClean="0"/>
-              <a:t>12/1/2021</a:t>
+              <a:t>12/2/2021</a:t>
             </a:fld>
             <a:endParaRPr lang="en-US"/>
           </a:p>
@@ -861,7 +867,7 @@
           <a:p>
             <a:fld id="{282267A0-FE7A-4CFE-BCE9-2173F1C93B40}" type="datetimeFigureOut">
               <a:rPr lang="en-US" smtClean="0"/>
-              <a:t>12/1/2021</a:t>
+              <a:t>12/2/2021</a:t>
             </a:fld>
             <a:endParaRPr lang="en-US"/>
           </a:p>
@@ -1136,7 +1142,7 @@
           <a:p>
             <a:fld id="{282267A0-FE7A-4CFE-BCE9-2173F1C93B40}" type="datetimeFigureOut">
               <a:rPr lang="en-US" smtClean="0"/>
-              <a:t>12/1/2021</a:t>
+              <a:t>12/2/2021</a:t>
             </a:fld>
             <a:endParaRPr lang="en-US"/>
           </a:p>
@@ -1401,7 +1407,7 @@
           <a:p>
             <a:fld id="{282267A0-FE7A-4CFE-BCE9-2173F1C93B40}" type="datetimeFigureOut">
               <a:rPr lang="en-US" smtClean="0"/>
-              <a:t>12/1/2021</a:t>
+              <a:t>12/2/2021</a:t>
             </a:fld>
             <a:endParaRPr lang="en-US"/>
           </a:p>
@@ -1813,7 +1819,7 @@
           <a:p>
             <a:fld id="{282267A0-FE7A-4CFE-BCE9-2173F1C93B40}" type="datetimeFigureOut">
               <a:rPr lang="en-US" smtClean="0"/>
-              <a:t>12/1/2021</a:t>
+              <a:t>12/2/2021</a:t>
             </a:fld>
             <a:endParaRPr lang="en-US"/>
           </a:p>
@@ -1954,7 +1960,7 @@
           <a:p>
             <a:fld id="{282267A0-FE7A-4CFE-BCE9-2173F1C93B40}" type="datetimeFigureOut">
               <a:rPr lang="en-US" smtClean="0"/>
-              <a:t>12/1/2021</a:t>
+              <a:t>12/2/2021</a:t>
             </a:fld>
             <a:endParaRPr lang="en-US"/>
           </a:p>
@@ -2067,7 +2073,7 @@
           <a:p>
             <a:fld id="{282267A0-FE7A-4CFE-BCE9-2173F1C93B40}" type="datetimeFigureOut">
               <a:rPr lang="en-US" smtClean="0"/>
-              <a:t>12/1/2021</a:t>
+              <a:t>12/2/2021</a:t>
             </a:fld>
             <a:endParaRPr lang="en-US"/>
           </a:p>
@@ -2378,7 +2384,7 @@
           <a:p>
             <a:fld id="{282267A0-FE7A-4CFE-BCE9-2173F1C93B40}" type="datetimeFigureOut">
               <a:rPr lang="en-US" smtClean="0"/>
-              <a:t>12/1/2021</a:t>
+              <a:t>12/2/2021</a:t>
             </a:fld>
             <a:endParaRPr lang="en-US"/>
           </a:p>
@@ -2666,7 +2672,7 @@
           <a:p>
             <a:fld id="{282267A0-FE7A-4CFE-BCE9-2173F1C93B40}" type="datetimeFigureOut">
               <a:rPr lang="en-US" smtClean="0"/>
-              <a:t>12/1/2021</a:t>
+              <a:t>12/2/2021</a:t>
             </a:fld>
             <a:endParaRPr lang="en-US"/>
           </a:p>
@@ -2907,7 +2913,7 @@
           <a:p>
             <a:fld id="{282267A0-FE7A-4CFE-BCE9-2173F1C93B40}" type="datetimeFigureOut">
               <a:rPr lang="en-US" smtClean="0"/>
-              <a:t>12/1/2021</a:t>
+              <a:t>12/2/2021</a:t>
             </a:fld>
             <a:endParaRPr lang="en-US"/>
           </a:p>
@@ -3401,7 +3407,7 @@
         </p:blipFill>
         <p:spPr>
           <a:xfrm>
-            <a:off x="79018" y="81749"/>
+            <a:off x="688618" y="119849"/>
             <a:ext cx="1090359" cy="182796"/>
           </a:xfrm>
           <a:prstGeom prst="rect">
@@ -3516,7 +3522,7 @@
         </p:blipFill>
         <p:spPr>
           <a:xfrm>
-            <a:off x="79018" y="81749"/>
+            <a:off x="685800" y="118872"/>
             <a:ext cx="1090359" cy="182796"/>
           </a:xfrm>
           <a:prstGeom prst="rect">
@@ -3631,7 +3637,7 @@
         </p:blipFill>
         <p:spPr>
           <a:xfrm>
-            <a:off x="79018" y="81749"/>
+            <a:off x="685800" y="118872"/>
             <a:ext cx="1090359" cy="182796"/>
           </a:xfrm>
           <a:prstGeom prst="rect">
@@ -3746,7 +3752,7 @@
         </p:blipFill>
         <p:spPr>
           <a:xfrm>
-            <a:off x="79018" y="81749"/>
+            <a:off x="685800" y="118872"/>
             <a:ext cx="1090359" cy="182796"/>
           </a:xfrm>
           <a:prstGeom prst="rect">
@@ -3758,6 +3764,698 @@
     <p:extLst>
       <p:ext uri="{BB962C8B-B14F-4D97-AF65-F5344CB8AC3E}">
         <p14:creationId xmlns:p14="http://schemas.microsoft.com/office/powerpoint/2010/main" val="3398284577"/>
+      </p:ext>
+    </p:extLst>
+  </p:cSld>
+  <p:clrMapOvr>
+    <a:masterClrMapping/>
+  </p:clrMapOvr>
+</p:sld>
+</file>
+
+<file path=ppt/slides/slide5.xml><?xml version="1.0" encoding="utf-8"?>
+<p:sld xmlns:a="http://schemas.openxmlformats.org/drawingml/2006/main" xmlns:r="http://schemas.openxmlformats.org/officeDocument/2006/relationships" xmlns:p="http://schemas.openxmlformats.org/presentationml/2006/main">
+  <p:cSld>
+    <p:spTree>
+      <p:nvGrpSpPr>
+        <p:cNvPr id="1" name=""/>
+        <p:cNvGrpSpPr/>
+        <p:nvPr/>
+      </p:nvGrpSpPr>
+      <p:grpSpPr>
+        <a:xfrm>
+          <a:off x="0" y="0"/>
+          <a:ext cx="0" cy="0"/>
+          <a:chOff x="0" y="0"/>
+          <a:chExt cx="0" cy="0"/>
+        </a:xfrm>
+      </p:grpSpPr>
+      <p:sp>
+        <p:nvSpPr>
+          <p:cNvPr id="13" name="Speech Bubble: Rectangle with Corners Rounded 12">
+            <a:extLst>
+              <a:ext uri="{FF2B5EF4-FFF2-40B4-BE49-F238E27FC236}">
+                <a16:creationId xmlns:a16="http://schemas.microsoft.com/office/drawing/2014/main" id="{FAE0AC89-D5E3-4F04-A56B-1D0CBA4AD80B}"/>
+              </a:ext>
+            </a:extLst>
+          </p:cNvPr>
+          <p:cNvSpPr/>
+          <p:nvPr/>
+        </p:nvSpPr>
+        <p:spPr>
+          <a:xfrm rot="5400000">
+            <a:off x="549148" y="1983096"/>
+            <a:ext cx="787397" cy="1051469"/>
+          </a:xfrm>
+          <a:prstGeom prst="wedgeRoundRectCallout">
+            <a:avLst>
+              <a:gd name="adj1" fmla="val -81606"/>
+              <a:gd name="adj2" fmla="val -55514"/>
+              <a:gd name="adj3" fmla="val 16667"/>
+            </a:avLst>
+          </a:prstGeom>
+          <a:noFill/>
+          <a:ln w="25400">
+            <a:solidFill>
+              <a:srgbClr val="13233E"/>
+            </a:solidFill>
+          </a:ln>
+        </p:spPr>
+        <p:style>
+          <a:lnRef idx="2">
+            <a:schemeClr val="accent1">
+              <a:shade val="50000"/>
+            </a:schemeClr>
+          </a:lnRef>
+          <a:fillRef idx="1">
+            <a:schemeClr val="accent1"/>
+          </a:fillRef>
+          <a:effectRef idx="0">
+            <a:schemeClr val="accent1"/>
+          </a:effectRef>
+          <a:fontRef idx="minor">
+            <a:schemeClr val="lt1"/>
+          </a:fontRef>
+        </p:style>
+        <p:txBody>
+          <a:bodyPr rtlCol="0" anchor="ctr"/>
+          <a:lstStyle/>
+          <a:p>
+            <a:pPr algn="ctr"/>
+            <a:endParaRPr lang="en-US" dirty="0">
+              <a:solidFill>
+                <a:schemeClr val="tx1"/>
+              </a:solidFill>
+            </a:endParaRPr>
+          </a:p>
+        </p:txBody>
+      </p:sp>
+      <p:sp>
+        <p:nvSpPr>
+          <p:cNvPr id="16" name="TextBox 15">
+            <a:extLst>
+              <a:ext uri="{FF2B5EF4-FFF2-40B4-BE49-F238E27FC236}">
+                <a16:creationId xmlns:a16="http://schemas.microsoft.com/office/drawing/2014/main" id="{F48D2ACB-4119-4D1A-835E-21E28673F58E}"/>
+              </a:ext>
+            </a:extLst>
+          </p:cNvPr>
+          <p:cNvSpPr txBox="1"/>
+          <p:nvPr/>
+        </p:nvSpPr>
+        <p:spPr>
+          <a:xfrm>
+            <a:off x="417112" y="3185892"/>
+            <a:ext cx="1136074" cy="707886"/>
+          </a:xfrm>
+          <a:prstGeom prst="rect">
+            <a:avLst/>
+          </a:prstGeom>
+          <a:noFill/>
+        </p:spPr>
+        <p:txBody>
+          <a:bodyPr wrap="square" rtlCol="0">
+            <a:spAutoFit/>
+          </a:bodyPr>
+          <a:lstStyle/>
+          <a:p>
+            <a:r>
+              <a:rPr lang="en-US" sz="1000" dirty="0"/>
+              <a:t>Drill up to show only Cohort if sub-group currently showing</a:t>
+            </a:r>
+          </a:p>
+        </p:txBody>
+      </p:sp>
+      <p:grpSp>
+        <p:nvGrpSpPr>
+          <p:cNvPr id="31" name="Group 30">
+            <a:extLst>
+              <a:ext uri="{FF2B5EF4-FFF2-40B4-BE49-F238E27FC236}">
+                <a16:creationId xmlns:a16="http://schemas.microsoft.com/office/drawing/2014/main" id="{FBD2DAED-6DF3-45A9-A405-7A14C09D9708}"/>
+              </a:ext>
+            </a:extLst>
+          </p:cNvPr>
+          <p:cNvGrpSpPr/>
+          <p:nvPr/>
+        </p:nvGrpSpPr>
+        <p:grpSpPr>
+          <a:xfrm>
+            <a:off x="3755336" y="2064283"/>
+            <a:ext cx="4681327" cy="2156736"/>
+            <a:chOff x="3755336" y="2064283"/>
+            <a:chExt cx="4681327" cy="2156736"/>
+          </a:xfrm>
+        </p:grpSpPr>
+        <p:pic>
+          <p:nvPicPr>
+            <p:cNvPr id="5" name="Picture 4">
+              <a:extLst>
+                <a:ext uri="{FF2B5EF4-FFF2-40B4-BE49-F238E27FC236}">
+                  <a16:creationId xmlns:a16="http://schemas.microsoft.com/office/drawing/2014/main" id="{A538FFCF-5495-410E-9E0F-AC3FA4B62748}"/>
+                </a:ext>
+              </a:extLst>
+            </p:cNvPr>
+            <p:cNvPicPr>
+              <a:picLocks noChangeAspect="1"/>
+            </p:cNvPicPr>
+            <p:nvPr/>
+          </p:nvPicPr>
+          <p:blipFill>
+            <a:blip r:embed="rId2"/>
+            <a:stretch>
+              <a:fillRect/>
+            </a:stretch>
+          </p:blipFill>
+          <p:spPr>
+            <a:xfrm>
+              <a:off x="5367236" y="2285968"/>
+              <a:ext cx="1457528" cy="457264"/>
+            </a:xfrm>
+            <a:prstGeom prst="rect">
+              <a:avLst/>
+            </a:prstGeom>
+          </p:spPr>
+        </p:pic>
+        <p:sp>
+          <p:nvSpPr>
+            <p:cNvPr id="6" name="Rectangle: Rounded Corners 5">
+              <a:extLst>
+                <a:ext uri="{FF2B5EF4-FFF2-40B4-BE49-F238E27FC236}">
+                  <a16:creationId xmlns:a16="http://schemas.microsoft.com/office/drawing/2014/main" id="{6E614332-EC50-4F2E-AFD6-C4FF11346BE4}"/>
+                </a:ext>
+              </a:extLst>
+            </p:cNvPr>
+            <p:cNvSpPr/>
+            <p:nvPr/>
+          </p:nvSpPr>
+          <p:spPr>
+            <a:xfrm>
+              <a:off x="3755336" y="2064283"/>
+              <a:ext cx="4681327" cy="2156736"/>
+            </a:xfrm>
+            <a:prstGeom prst="roundRect">
+              <a:avLst/>
+            </a:prstGeom>
+            <a:noFill/>
+            <a:ln w="38100">
+              <a:solidFill>
+                <a:srgbClr val="13233E"/>
+              </a:solidFill>
+            </a:ln>
+          </p:spPr>
+          <p:style>
+            <a:lnRef idx="2">
+              <a:schemeClr val="accent1">
+                <a:shade val="50000"/>
+              </a:schemeClr>
+            </a:lnRef>
+            <a:fillRef idx="1">
+              <a:schemeClr val="accent1"/>
+            </a:fillRef>
+            <a:effectRef idx="0">
+              <a:schemeClr val="accent1"/>
+            </a:effectRef>
+            <a:fontRef idx="minor">
+              <a:schemeClr val="lt1"/>
+            </a:fontRef>
+          </p:style>
+          <p:txBody>
+            <a:bodyPr rtlCol="0" anchor="ctr"/>
+            <a:lstStyle/>
+            <a:p>
+              <a:pPr algn="ctr"/>
+              <a:endParaRPr lang="en-US"/>
+            </a:p>
+          </p:txBody>
+        </p:sp>
+        <p:grpSp>
+          <p:nvGrpSpPr>
+            <p:cNvPr id="14" name="Group 13">
+              <a:extLst>
+                <a:ext uri="{FF2B5EF4-FFF2-40B4-BE49-F238E27FC236}">
+                  <a16:creationId xmlns:a16="http://schemas.microsoft.com/office/drawing/2014/main" id="{966CA54C-E097-4B90-92CC-2E016F94CE69}"/>
+                </a:ext>
+              </a:extLst>
+            </p:cNvPr>
+            <p:cNvGrpSpPr/>
+            <p:nvPr/>
+          </p:nvGrpSpPr>
+          <p:grpSpPr>
+            <a:xfrm>
+              <a:off x="3971634" y="2152075"/>
+              <a:ext cx="1136075" cy="883226"/>
+              <a:chOff x="3971634" y="2152075"/>
+              <a:chExt cx="1136075" cy="883226"/>
+            </a:xfrm>
+          </p:grpSpPr>
+          <p:sp>
+            <p:nvSpPr>
+              <p:cNvPr id="7" name="Speech Bubble: Rectangle with Corners Rounded 6">
+                <a:extLst>
+                  <a:ext uri="{FF2B5EF4-FFF2-40B4-BE49-F238E27FC236}">
+                    <a16:creationId xmlns:a16="http://schemas.microsoft.com/office/drawing/2014/main" id="{0C18D344-A773-45F4-B550-D791876E1775}"/>
+                  </a:ext>
+                </a:extLst>
+              </p:cNvPr>
+              <p:cNvSpPr/>
+              <p:nvPr/>
+            </p:nvSpPr>
+            <p:spPr>
+              <a:xfrm rot="5400000">
+                <a:off x="4055756" y="2067953"/>
+                <a:ext cx="883226" cy="1051469"/>
+              </a:xfrm>
+              <a:prstGeom prst="wedgeRoundRectCallout">
+                <a:avLst>
+                  <a:gd name="adj1" fmla="val -8878"/>
+                  <a:gd name="adj2" fmla="val -80110"/>
+                  <a:gd name="adj3" fmla="val 16667"/>
+                </a:avLst>
+              </a:prstGeom>
+              <a:noFill/>
+              <a:ln w="25400">
+                <a:solidFill>
+                  <a:srgbClr val="13233E"/>
+                </a:solidFill>
+              </a:ln>
+            </p:spPr>
+            <p:style>
+              <a:lnRef idx="2">
+                <a:schemeClr val="accent1">
+                  <a:shade val="50000"/>
+                </a:schemeClr>
+              </a:lnRef>
+              <a:fillRef idx="1">
+                <a:schemeClr val="accent1"/>
+              </a:fillRef>
+              <a:effectRef idx="0">
+                <a:schemeClr val="accent1"/>
+              </a:effectRef>
+              <a:fontRef idx="minor">
+                <a:schemeClr val="lt1"/>
+              </a:fontRef>
+            </p:style>
+            <p:txBody>
+              <a:bodyPr rtlCol="0" anchor="ctr"/>
+              <a:lstStyle/>
+              <a:p>
+                <a:pPr algn="ctr"/>
+                <a:endParaRPr lang="en-US" dirty="0">
+                  <a:solidFill>
+                    <a:schemeClr val="tx1"/>
+                  </a:solidFill>
+                </a:endParaRPr>
+              </a:p>
+            </p:txBody>
+          </p:sp>
+          <p:sp>
+            <p:nvSpPr>
+              <p:cNvPr id="10" name="TextBox 9">
+                <a:extLst>
+                  <a:ext uri="{FF2B5EF4-FFF2-40B4-BE49-F238E27FC236}">
+                    <a16:creationId xmlns:a16="http://schemas.microsoft.com/office/drawing/2014/main" id="{268D19D5-80FA-445D-9C8F-2A73AE28A3AF}"/>
+                  </a:ext>
+                </a:extLst>
+              </p:cNvPr>
+              <p:cNvSpPr txBox="1"/>
+              <p:nvPr/>
+            </p:nvSpPr>
+            <p:spPr>
+              <a:xfrm>
+                <a:off x="3971635" y="2194643"/>
+                <a:ext cx="1136074" cy="707886"/>
+              </a:xfrm>
+              <a:prstGeom prst="rect">
+                <a:avLst/>
+              </a:prstGeom>
+              <a:noFill/>
+            </p:spPr>
+            <p:txBody>
+              <a:bodyPr wrap="square" rtlCol="0">
+                <a:spAutoFit/>
+              </a:bodyPr>
+              <a:lstStyle/>
+              <a:p>
+                <a:r>
+                  <a:rPr lang="en-US" sz="1000" dirty="0"/>
+                  <a:t>Drill up to show only cohort if sub-group currently showing</a:t>
+                </a:r>
+              </a:p>
+            </p:txBody>
+          </p:sp>
+        </p:grpSp>
+        <p:grpSp>
+          <p:nvGrpSpPr>
+            <p:cNvPr id="27" name="Group 26">
+              <a:extLst>
+                <a:ext uri="{FF2B5EF4-FFF2-40B4-BE49-F238E27FC236}">
+                  <a16:creationId xmlns:a16="http://schemas.microsoft.com/office/drawing/2014/main" id="{2E2F7B7D-7C50-4BA0-B9ED-291D3A71FDD0}"/>
+                </a:ext>
+              </a:extLst>
+            </p:cNvPr>
+            <p:cNvGrpSpPr/>
+            <p:nvPr/>
+          </p:nvGrpSpPr>
+          <p:grpSpPr>
+            <a:xfrm>
+              <a:off x="4608184" y="3120525"/>
+              <a:ext cx="1125361" cy="883227"/>
+              <a:chOff x="4608184" y="3120525"/>
+              <a:chExt cx="1125361" cy="883227"/>
+            </a:xfrm>
+          </p:grpSpPr>
+          <p:sp>
+            <p:nvSpPr>
+              <p:cNvPr id="15" name="Speech Bubble: Rectangle with Corners Rounded 14">
+                <a:extLst>
+                  <a:ext uri="{FF2B5EF4-FFF2-40B4-BE49-F238E27FC236}">
+                    <a16:creationId xmlns:a16="http://schemas.microsoft.com/office/drawing/2014/main" id="{098DCF6E-FC9B-4BCC-B523-42FCC0233291}"/>
+                  </a:ext>
+                </a:extLst>
+              </p:cNvPr>
+              <p:cNvSpPr/>
+              <p:nvPr/>
+            </p:nvSpPr>
+            <p:spPr>
+              <a:xfrm rot="5400000">
+                <a:off x="4692305" y="3036404"/>
+                <a:ext cx="883227" cy="1051469"/>
+              </a:xfrm>
+              <a:prstGeom prst="wedgeRoundRectCallout">
+                <a:avLst>
+                  <a:gd name="adj1" fmla="val -101547"/>
+                  <a:gd name="adj2" fmla="val -72204"/>
+                  <a:gd name="adj3" fmla="val 16667"/>
+                </a:avLst>
+              </a:prstGeom>
+              <a:noFill/>
+              <a:ln w="25400">
+                <a:solidFill>
+                  <a:srgbClr val="13233E"/>
+                </a:solidFill>
+              </a:ln>
+            </p:spPr>
+            <p:style>
+              <a:lnRef idx="2">
+                <a:schemeClr val="accent1">
+                  <a:shade val="50000"/>
+                </a:schemeClr>
+              </a:lnRef>
+              <a:fillRef idx="1">
+                <a:schemeClr val="accent1"/>
+              </a:fillRef>
+              <a:effectRef idx="0">
+                <a:schemeClr val="accent1"/>
+              </a:effectRef>
+              <a:fontRef idx="minor">
+                <a:schemeClr val="lt1"/>
+              </a:fontRef>
+            </p:style>
+            <p:txBody>
+              <a:bodyPr rtlCol="0" anchor="ctr"/>
+              <a:lstStyle/>
+              <a:p>
+                <a:pPr algn="ctr"/>
+                <a:endParaRPr lang="en-US" dirty="0">
+                  <a:solidFill>
+                    <a:schemeClr val="tx1"/>
+                  </a:solidFill>
+                </a:endParaRPr>
+              </a:p>
+            </p:txBody>
+          </p:sp>
+          <p:sp>
+            <p:nvSpPr>
+              <p:cNvPr id="17" name="TextBox 16">
+                <a:extLst>
+                  <a:ext uri="{FF2B5EF4-FFF2-40B4-BE49-F238E27FC236}">
+                    <a16:creationId xmlns:a16="http://schemas.microsoft.com/office/drawing/2014/main" id="{4F725265-A570-4680-9EFA-8A9E806D7E6C}"/>
+                  </a:ext>
+                </a:extLst>
+              </p:cNvPr>
+              <p:cNvSpPr txBox="1"/>
+              <p:nvPr/>
+            </p:nvSpPr>
+            <p:spPr>
+              <a:xfrm>
+                <a:off x="4682076" y="3123092"/>
+                <a:ext cx="1051469" cy="784830"/>
+              </a:xfrm>
+              <a:prstGeom prst="rect">
+                <a:avLst/>
+              </a:prstGeom>
+              <a:noFill/>
+            </p:spPr>
+            <p:txBody>
+              <a:bodyPr wrap="square" rtlCol="0">
+                <a:spAutoFit/>
+              </a:bodyPr>
+              <a:lstStyle/>
+              <a:p>
+                <a:r>
+                  <a:rPr lang="en-US" sz="900" dirty="0"/>
+                  <a:t>Enable drilldown. If selected, click a value in cohort column to drill down.</a:t>
+                </a:r>
+              </a:p>
+            </p:txBody>
+          </p:sp>
+        </p:grpSp>
+        <p:grpSp>
+          <p:nvGrpSpPr>
+            <p:cNvPr id="21" name="Group 20">
+              <a:extLst>
+                <a:ext uri="{FF2B5EF4-FFF2-40B4-BE49-F238E27FC236}">
+                  <a16:creationId xmlns:a16="http://schemas.microsoft.com/office/drawing/2014/main" id="{6A85D0AA-4C84-4D38-AC95-88BBD7575295}"/>
+                </a:ext>
+              </a:extLst>
+            </p:cNvPr>
+            <p:cNvGrpSpPr/>
+            <p:nvPr/>
+          </p:nvGrpSpPr>
+          <p:grpSpPr>
+            <a:xfrm>
+              <a:off x="5925487" y="3035301"/>
+              <a:ext cx="1136074" cy="787397"/>
+              <a:chOff x="5925487" y="3035301"/>
+              <a:chExt cx="1136074" cy="787397"/>
+            </a:xfrm>
+          </p:grpSpPr>
+          <p:sp>
+            <p:nvSpPr>
+              <p:cNvPr id="19" name="Speech Bubble: Rectangle with Corners Rounded 18">
+                <a:extLst>
+                  <a:ext uri="{FF2B5EF4-FFF2-40B4-BE49-F238E27FC236}">
+                    <a16:creationId xmlns:a16="http://schemas.microsoft.com/office/drawing/2014/main" id="{B2B7F50A-801B-4708-AD6E-EFAA0CBD6879}"/>
+                  </a:ext>
+                </a:extLst>
+              </p:cNvPr>
+              <p:cNvSpPr/>
+              <p:nvPr/>
+            </p:nvSpPr>
+            <p:spPr>
+              <a:xfrm rot="5400000">
+                <a:off x="6057523" y="2903265"/>
+                <a:ext cx="787397" cy="1051469"/>
+              </a:xfrm>
+              <a:prstGeom prst="wedgeRoundRectCallout">
+                <a:avLst>
+                  <a:gd name="adj1" fmla="val -93336"/>
+                  <a:gd name="adj2" fmla="val 17395"/>
+                  <a:gd name="adj3" fmla="val 16667"/>
+                </a:avLst>
+              </a:prstGeom>
+              <a:noFill/>
+              <a:ln w="25400">
+                <a:solidFill>
+                  <a:srgbClr val="13233E"/>
+                </a:solidFill>
+              </a:ln>
+            </p:spPr>
+            <p:style>
+              <a:lnRef idx="2">
+                <a:schemeClr val="accent1">
+                  <a:shade val="50000"/>
+                </a:schemeClr>
+              </a:lnRef>
+              <a:fillRef idx="1">
+                <a:schemeClr val="accent1"/>
+              </a:fillRef>
+              <a:effectRef idx="0">
+                <a:schemeClr val="accent1"/>
+              </a:effectRef>
+              <a:fontRef idx="minor">
+                <a:schemeClr val="lt1"/>
+              </a:fontRef>
+            </p:style>
+            <p:txBody>
+              <a:bodyPr rtlCol="0" anchor="ctr"/>
+              <a:lstStyle/>
+              <a:p>
+                <a:pPr algn="ctr"/>
+                <a:endParaRPr lang="en-US" dirty="0">
+                  <a:solidFill>
+                    <a:schemeClr val="tx1"/>
+                  </a:solidFill>
+                </a:endParaRPr>
+              </a:p>
+            </p:txBody>
+          </p:sp>
+          <p:sp>
+            <p:nvSpPr>
+              <p:cNvPr id="20" name="TextBox 19">
+                <a:extLst>
+                  <a:ext uri="{FF2B5EF4-FFF2-40B4-BE49-F238E27FC236}">
+                    <a16:creationId xmlns:a16="http://schemas.microsoft.com/office/drawing/2014/main" id="{3E39139B-0B64-4E1A-996F-F37FFAF6FDF0}"/>
+                  </a:ext>
+                </a:extLst>
+              </p:cNvPr>
+              <p:cNvSpPr txBox="1"/>
+              <p:nvPr/>
+            </p:nvSpPr>
+            <p:spPr>
+              <a:xfrm>
+                <a:off x="5925487" y="3075056"/>
+                <a:ext cx="1136074" cy="707886"/>
+              </a:xfrm>
+              <a:prstGeom prst="rect">
+                <a:avLst/>
+              </a:prstGeom>
+              <a:noFill/>
+            </p:spPr>
+            <p:txBody>
+              <a:bodyPr wrap="square" rtlCol="0">
+                <a:spAutoFit/>
+              </a:bodyPr>
+              <a:lstStyle/>
+              <a:p>
+                <a:r>
+                  <a:rPr lang="en-US" sz="1000" dirty="0"/>
+                  <a:t>If cohort showing, select to show sub-group level only. </a:t>
+                </a:r>
+              </a:p>
+            </p:txBody>
+          </p:sp>
+        </p:grpSp>
+        <p:grpSp>
+          <p:nvGrpSpPr>
+            <p:cNvPr id="30" name="Group 29">
+              <a:extLst>
+                <a:ext uri="{FF2B5EF4-FFF2-40B4-BE49-F238E27FC236}">
+                  <a16:creationId xmlns:a16="http://schemas.microsoft.com/office/drawing/2014/main" id="{D52F62B3-5C98-4503-9D1D-581DFDC45D34}"/>
+                </a:ext>
+              </a:extLst>
+            </p:cNvPr>
+            <p:cNvGrpSpPr/>
+            <p:nvPr/>
+          </p:nvGrpSpPr>
+          <p:grpSpPr>
+            <a:xfrm>
+              <a:off x="7168896" y="2776025"/>
+              <a:ext cx="1192432" cy="899395"/>
+              <a:chOff x="7168896" y="2776025"/>
+              <a:chExt cx="1192432" cy="899395"/>
+            </a:xfrm>
+          </p:grpSpPr>
+          <p:sp>
+            <p:nvSpPr>
+              <p:cNvPr id="22" name="Speech Bubble: Rectangle with Corners Rounded 21">
+                <a:extLst>
+                  <a:ext uri="{FF2B5EF4-FFF2-40B4-BE49-F238E27FC236}">
+                    <a16:creationId xmlns:a16="http://schemas.microsoft.com/office/drawing/2014/main" id="{AA74C8AF-CFA3-4795-9750-BF027D7686B0}"/>
+                  </a:ext>
+                </a:extLst>
+              </p:cNvPr>
+              <p:cNvSpPr/>
+              <p:nvPr/>
+            </p:nvSpPr>
+            <p:spPr>
+              <a:xfrm rot="5400000">
+                <a:off x="7323498" y="2637591"/>
+                <a:ext cx="883227" cy="1192431"/>
+              </a:xfrm>
+              <a:prstGeom prst="wedgeRoundRectCallout">
+                <a:avLst>
+                  <a:gd name="adj1" fmla="val -59318"/>
+                  <a:gd name="adj2" fmla="val 94696"/>
+                  <a:gd name="adj3" fmla="val 16667"/>
+                </a:avLst>
+              </a:prstGeom>
+              <a:noFill/>
+              <a:ln w="25400">
+                <a:solidFill>
+                  <a:srgbClr val="13233E"/>
+                </a:solidFill>
+              </a:ln>
+            </p:spPr>
+            <p:style>
+              <a:lnRef idx="2">
+                <a:schemeClr val="accent1">
+                  <a:shade val="50000"/>
+                </a:schemeClr>
+              </a:lnRef>
+              <a:fillRef idx="1">
+                <a:schemeClr val="accent1"/>
+              </a:fillRef>
+              <a:effectRef idx="0">
+                <a:schemeClr val="accent1"/>
+              </a:effectRef>
+              <a:fontRef idx="minor">
+                <a:schemeClr val="lt1"/>
+              </a:fontRef>
+            </p:style>
+            <p:txBody>
+              <a:bodyPr rtlCol="0" anchor="ctr"/>
+              <a:lstStyle/>
+              <a:p>
+                <a:pPr algn="ctr"/>
+                <a:endParaRPr lang="en-US" dirty="0">
+                  <a:solidFill>
+                    <a:schemeClr val="tx1"/>
+                  </a:solidFill>
+                </a:endParaRPr>
+              </a:p>
+            </p:txBody>
+          </p:sp>
+          <p:sp>
+            <p:nvSpPr>
+              <p:cNvPr id="23" name="TextBox 22">
+                <a:extLst>
+                  <a:ext uri="{FF2B5EF4-FFF2-40B4-BE49-F238E27FC236}">
+                    <a16:creationId xmlns:a16="http://schemas.microsoft.com/office/drawing/2014/main" id="{BE2052D8-D04D-440A-BEAF-2C86EBA59533}"/>
+                  </a:ext>
+                </a:extLst>
+              </p:cNvPr>
+              <p:cNvSpPr txBox="1"/>
+              <p:nvPr/>
+            </p:nvSpPr>
+            <p:spPr>
+              <a:xfrm>
+                <a:off x="7225254" y="2776025"/>
+                <a:ext cx="1136074" cy="861774"/>
+              </a:xfrm>
+              <a:prstGeom prst="rect">
+                <a:avLst/>
+              </a:prstGeom>
+              <a:noFill/>
+            </p:spPr>
+            <p:txBody>
+              <a:bodyPr wrap="square" rtlCol="0">
+                <a:spAutoFit/>
+              </a:bodyPr>
+              <a:lstStyle/>
+              <a:p>
+                <a:r>
+                  <a:rPr lang="en-US" sz="1000" dirty="0"/>
+                  <a:t>If only cohort showing, expand table to show cohort and sub-group. </a:t>
+                </a:r>
+              </a:p>
+            </p:txBody>
+          </p:sp>
+        </p:grpSp>
+      </p:grpSp>
+    </p:spTree>
+    <p:extLst>
+      <p:ext uri="{BB962C8B-B14F-4D97-AF65-F5344CB8AC3E}">
+        <p14:creationId xmlns:p14="http://schemas.microsoft.com/office/powerpoint/2010/main" val="4262851851"/>
       </p:ext>
     </p:extLst>
   </p:cSld>

</xml_diff>